<commit_message>
added olivia_watchdog.py, update olivia checklist
</commit_message>
<xml_diff>
--- a/google/olivia_help.pptx
+++ b/google/olivia_help.pptx
@@ -1819,10 +1819,24 @@
     <dgm:pt modelId="{FF6C1D2B-4C70-4ADC-9167-0A731686B115}" type="parTrans" cxnId="{3874AA00-1D20-42AD-A555-6FBF79019886}">
       <dgm:prSet/>
       <dgm:spPr/>
+      <dgm:t>
+        <a:bodyPr/>
+        <a:lstStyle/>
+        <a:p>
+          <a:endParaRPr lang="en-PH"/>
+        </a:p>
+      </dgm:t>
     </dgm:pt>
     <dgm:pt modelId="{64F3D272-925A-4C2A-9D8C-326C8A65DE3D}" type="sibTrans" cxnId="{3874AA00-1D20-42AD-A555-6FBF79019886}">
       <dgm:prSet/>
       <dgm:spPr/>
+      <dgm:t>
+        <a:bodyPr/>
+        <a:lstStyle/>
+        <a:p>
+          <a:endParaRPr lang="en-PH"/>
+        </a:p>
+      </dgm:t>
     </dgm:pt>
     <dgm:pt modelId="{C4344EC9-6F89-4250-9CB4-1B93F5DC2463}">
       <dgm:prSet phldr="0" custT="1"/>
@@ -1864,10 +1878,253 @@
     <dgm:pt modelId="{8B0C69E0-3103-4312-88BF-263CDB5D925E}" type="parTrans" cxnId="{D5FEF72A-6748-46B9-95FA-3D905226D5C9}">
       <dgm:prSet/>
       <dgm:spPr/>
+      <dgm:t>
+        <a:bodyPr/>
+        <a:lstStyle/>
+        <a:p>
+          <a:endParaRPr lang="en-PH"/>
+        </a:p>
+      </dgm:t>
     </dgm:pt>
     <dgm:pt modelId="{91DF7C24-0AC8-406E-BB41-E230A25517DF}" type="sibTrans" cxnId="{D5FEF72A-6748-46B9-95FA-3D905226D5C9}">
       <dgm:prSet/>
       <dgm:spPr/>
+      <dgm:t>
+        <a:bodyPr/>
+        <a:lstStyle/>
+        <a:p>
+          <a:endParaRPr lang="en-PH"/>
+        </a:p>
+      </dgm:t>
+    </dgm:pt>
+    <dgm:pt modelId="{1414CB55-05B5-4C02-99F8-14390BFDDBF0}">
+      <dgm:prSet phldr="0" custT="1"/>
+      <dgm:spPr/>
+      <dgm:t>
+        <a:bodyPr/>
+        <a:lstStyle/>
+        <a:p>
+          <a:pPr rtl="0"/>
+          <a:r>
+            <a:rPr lang="en-US" sz="2400" i="0" u="none" dirty="0" err="1">
+              <a:effectLst>
+                <a:outerShdw blurRad="38100" dist="38100" dir="2700000" algn="tl">
+                  <a:srgbClr val="000000">
+                    <a:alpha val="43137"/>
+                  </a:srgbClr>
+                </a:outerShdw>
+              </a:effectLst>
+              <a:latin typeface="+mn-lt"/>
+            </a:rPr>
+            <a:t>olivia</a:t>
+          </a:r>
+          <a:r>
+            <a:rPr lang="en-US" sz="2400" i="0" u="none" dirty="0">
+              <a:effectLst>
+                <a:outerShdw blurRad="38100" dist="38100" dir="2700000" algn="tl">
+                  <a:srgbClr val="000000">
+                    <a:alpha val="43137"/>
+                  </a:srgbClr>
+                </a:outerShdw>
+              </a:effectLst>
+              <a:latin typeface="+mn-lt"/>
+            </a:rPr>
+            <a:t> checklist</a:t>
+          </a:r>
+        </a:p>
+      </dgm:t>
+    </dgm:pt>
+    <dgm:pt modelId="{507D26F8-BC79-476E-9AE6-796ADB589A9E}" type="parTrans" cxnId="{C61566CE-2605-45D6-955E-CB4E50132391}">
+      <dgm:prSet/>
+      <dgm:spPr/>
+      <dgm:t>
+        <a:bodyPr/>
+        <a:lstStyle/>
+        <a:p>
+          <a:endParaRPr lang="en-PH"/>
+        </a:p>
+      </dgm:t>
+    </dgm:pt>
+    <dgm:pt modelId="{500FC536-3CC3-4E6E-9930-C2E53F7B4046}" type="sibTrans" cxnId="{C61566CE-2605-45D6-955E-CB4E50132391}">
+      <dgm:prSet/>
+      <dgm:spPr/>
+      <dgm:t>
+        <a:bodyPr/>
+        <a:lstStyle/>
+        <a:p>
+          <a:endParaRPr lang="en-PH"/>
+        </a:p>
+      </dgm:t>
+    </dgm:pt>
+    <dgm:pt modelId="{6AD3977E-4573-4CDF-97AD-321C0C38DBAD}">
+      <dgm:prSet phldr="0" custT="1"/>
+      <dgm:spPr/>
+      <dgm:t>
+        <a:bodyPr/>
+        <a:lstStyle/>
+        <a:p>
+          <a:pPr rtl="0"/>
+          <a:r>
+            <a:rPr lang="en-US" sz="2400" i="0" u="none" dirty="0" err="1">
+              <a:effectLst>
+                <a:outerShdw blurRad="38100" dist="38100" dir="2700000" algn="tl">
+                  <a:srgbClr val="000000">
+                    <a:alpha val="43137"/>
+                  </a:srgbClr>
+                </a:outerShdw>
+              </a:effectLst>
+              <a:latin typeface="+mn-lt"/>
+            </a:rPr>
+            <a:t>olivia</a:t>
+          </a:r>
+          <a:r>
+            <a:rPr lang="en-US" sz="2400" i="0" u="none" dirty="0">
+              <a:effectLst>
+                <a:outerShdw blurRad="38100" dist="38100" dir="2700000" algn="tl">
+                  <a:srgbClr val="000000">
+                    <a:alpha val="43137"/>
+                  </a:srgbClr>
+                </a:outerShdw>
+              </a:effectLst>
+              <a:latin typeface="+mn-lt"/>
+            </a:rPr>
+            <a:t> </a:t>
+          </a:r>
+          <a:r>
+            <a:rPr lang="en-US" sz="2400" i="0" u="none" dirty="0" err="1">
+              <a:effectLst>
+                <a:outerShdw blurRad="38100" dist="38100" dir="2700000" algn="tl">
+                  <a:srgbClr val="000000">
+                    <a:alpha val="43137"/>
+                  </a:srgbClr>
+                </a:outerShdw>
+              </a:effectLst>
+              <a:latin typeface="+mn-lt"/>
+            </a:rPr>
+            <a:t>ano</a:t>
+          </a:r>
+          <a:r>
+            <a:rPr lang="en-US" sz="2400" i="0" u="none" dirty="0">
+              <a:effectLst>
+                <a:outerShdw blurRad="38100" dist="38100" dir="2700000" algn="tl">
+                  <a:srgbClr val="000000">
+                    <a:alpha val="43137"/>
+                  </a:srgbClr>
+                </a:outerShdw>
+              </a:effectLst>
+              <a:latin typeface="+mn-lt"/>
+            </a:rPr>
+            <a:t> number [nickname/logger]</a:t>
+          </a:r>
+        </a:p>
+      </dgm:t>
+    </dgm:pt>
+    <dgm:pt modelId="{2567FF4E-94A0-4933-A6C6-A695A7FDA019}" type="parTrans" cxnId="{149E8610-E1B1-452F-90EE-86ED9A0AB225}">
+      <dgm:prSet/>
+      <dgm:spPr/>
+      <dgm:t>
+        <a:bodyPr/>
+        <a:lstStyle/>
+        <a:p>
+          <a:endParaRPr lang="en-PH"/>
+        </a:p>
+      </dgm:t>
+    </dgm:pt>
+    <dgm:pt modelId="{1910FB6B-B23C-41F3-B0EA-5A4C5C062889}" type="sibTrans" cxnId="{149E8610-E1B1-452F-90EE-86ED9A0AB225}">
+      <dgm:prSet/>
+      <dgm:spPr/>
+      <dgm:t>
+        <a:bodyPr/>
+        <a:lstStyle/>
+        <a:p>
+          <a:endParaRPr lang="en-PH"/>
+        </a:p>
+      </dgm:t>
+    </dgm:pt>
+    <dgm:pt modelId="{715AA07E-F50C-4C3D-BB23-747FEA4AD6D7}">
+      <dgm:prSet phldr="0" custT="1"/>
+      <dgm:spPr/>
+      <dgm:t>
+        <a:bodyPr/>
+        <a:lstStyle/>
+        <a:p>
+          <a:pPr rtl="0"/>
+          <a:r>
+            <a:rPr lang="en-US" sz="2400" i="0" u="none" dirty="0" err="1">
+              <a:effectLst>
+                <a:outerShdw blurRad="38100" dist="38100" dir="2700000" algn="tl">
+                  <a:srgbClr val="000000">
+                    <a:alpha val="43137"/>
+                  </a:srgbClr>
+                </a:outerShdw>
+              </a:effectLst>
+              <a:latin typeface="+mn-lt"/>
+            </a:rPr>
+            <a:t>olivia</a:t>
+          </a:r>
+          <a:r>
+            <a:rPr lang="en-US" sz="2400" i="0" u="none" dirty="0">
+              <a:effectLst>
+                <a:outerShdw blurRad="38100" dist="38100" dir="2700000" algn="tl">
+                  <a:srgbClr val="000000">
+                    <a:alpha val="43137"/>
+                  </a:srgbClr>
+                </a:outerShdw>
+              </a:effectLst>
+              <a:latin typeface="+mn-lt"/>
+            </a:rPr>
+            <a:t> </a:t>
+          </a:r>
+          <a:r>
+            <a:rPr lang="en-US" sz="2400" i="0" u="none" dirty="0" err="1">
+              <a:effectLst>
+                <a:outerShdw blurRad="38100" dist="38100" dir="2700000" algn="tl">
+                  <a:srgbClr val="000000">
+                    <a:alpha val="43137"/>
+                  </a:srgbClr>
+                </a:outerShdw>
+              </a:effectLst>
+              <a:latin typeface="+mn-lt"/>
+            </a:rPr>
+            <a:t>kanino</a:t>
+          </a:r>
+          <a:r>
+            <a:rPr lang="en-US" sz="2400" i="0" u="none" dirty="0">
+              <a:effectLst>
+                <a:outerShdw blurRad="38100" dist="38100" dir="2700000" algn="tl">
+                  <a:srgbClr val="000000">
+                    <a:alpha val="43137"/>
+                  </a:srgbClr>
+                </a:outerShdw>
+              </a:effectLst>
+              <a:latin typeface="+mn-lt"/>
+            </a:rPr>
+            <a:t> number</a:t>
+          </a:r>
+        </a:p>
+      </dgm:t>
+    </dgm:pt>
+    <dgm:pt modelId="{D5CB6829-2B66-4530-AE3B-E542436319B2}" type="parTrans" cxnId="{3345D211-AA89-49EC-8C84-551FF10D363C}">
+      <dgm:prSet/>
+      <dgm:spPr/>
+      <dgm:t>
+        <a:bodyPr/>
+        <a:lstStyle/>
+        <a:p>
+          <a:endParaRPr lang="en-PH"/>
+        </a:p>
+      </dgm:t>
+    </dgm:pt>
+    <dgm:pt modelId="{CA82AE89-2807-4676-9584-418C7C8D5277}" type="sibTrans" cxnId="{3345D211-AA89-49EC-8C84-551FF10D363C}">
+      <dgm:prSet/>
+      <dgm:spPr/>
+      <dgm:t>
+        <a:bodyPr/>
+        <a:lstStyle/>
+        <a:p>
+          <a:endParaRPr lang="en-PH"/>
+        </a:p>
+      </dgm:t>
     </dgm:pt>
     <dgm:pt modelId="{482831EA-3DBD-460B-A906-08DF721ACF24}" type="pres">
       <dgm:prSet presAssocID="{98215B50-9504-4A40-989C-D2FBCDC99796}" presName="linear" presStyleCnt="0">
@@ -1879,7 +2136,7 @@
       <dgm:spPr/>
     </dgm:pt>
     <dgm:pt modelId="{19E2F9BC-F3CC-4737-A5FE-75AA42E0ACDE}" type="pres">
-      <dgm:prSet presAssocID="{214F9E82-B142-4E12-9DC9-12C26A01CDF7}" presName="parentText" presStyleLbl="node1" presStyleIdx="0" presStyleCnt="12">
+      <dgm:prSet presAssocID="{214F9E82-B142-4E12-9DC9-12C26A01CDF7}" presName="parentText" presStyleLbl="node1" presStyleIdx="0" presStyleCnt="15">
         <dgm:presLayoutVars>
           <dgm:chMax val="0"/>
           <dgm:bulletEnabled val="1"/>
@@ -1892,7 +2149,7 @@
       <dgm:spPr/>
     </dgm:pt>
     <dgm:pt modelId="{DB6AF47B-488C-43AA-B7DA-922C367A07B7}" type="pres">
-      <dgm:prSet presAssocID="{26C303A4-3EFC-41FF-8CBA-77C991B80472}" presName="parentText" presStyleLbl="node1" presStyleIdx="1" presStyleCnt="12">
+      <dgm:prSet presAssocID="{26C303A4-3EFC-41FF-8CBA-77C991B80472}" presName="parentText" presStyleLbl="node1" presStyleIdx="1" presStyleCnt="15">
         <dgm:presLayoutVars>
           <dgm:chMax val="0"/>
           <dgm:bulletEnabled val="1"/>
@@ -1905,7 +2162,7 @@
       <dgm:spPr/>
     </dgm:pt>
     <dgm:pt modelId="{FE35FEFD-BCE6-43A7-B93C-B201FC64E570}" type="pres">
-      <dgm:prSet presAssocID="{D6E61F26-81B9-4B62-BADD-0E0292E5001C}" presName="parentText" presStyleLbl="node1" presStyleIdx="2" presStyleCnt="12">
+      <dgm:prSet presAssocID="{D6E61F26-81B9-4B62-BADD-0E0292E5001C}" presName="parentText" presStyleLbl="node1" presStyleIdx="2" presStyleCnt="15">
         <dgm:presLayoutVars>
           <dgm:chMax val="0"/>
           <dgm:bulletEnabled val="1"/>
@@ -1918,7 +2175,7 @@
       <dgm:spPr/>
     </dgm:pt>
     <dgm:pt modelId="{951DA4C9-83AB-468A-AB06-088C160529DA}" type="pres">
-      <dgm:prSet presAssocID="{B7A0A0A1-7D86-4A66-AAFC-4E2C1D3B1F56}" presName="parentText" presStyleLbl="node1" presStyleIdx="3" presStyleCnt="12">
+      <dgm:prSet presAssocID="{B7A0A0A1-7D86-4A66-AAFC-4E2C1D3B1F56}" presName="parentText" presStyleLbl="node1" presStyleIdx="3" presStyleCnt="15">
         <dgm:presLayoutVars>
           <dgm:chMax val="0"/>
           <dgm:bulletEnabled val="1"/>
@@ -1931,7 +2188,7 @@
       <dgm:spPr/>
     </dgm:pt>
     <dgm:pt modelId="{EF41CD9B-D98C-4D43-8DDA-F730EC53226C}" type="pres">
-      <dgm:prSet presAssocID="{358548BA-CEDB-41BE-9655-D918CEB97FF7}" presName="parentText" presStyleLbl="node1" presStyleIdx="4" presStyleCnt="12">
+      <dgm:prSet presAssocID="{358548BA-CEDB-41BE-9655-D918CEB97FF7}" presName="parentText" presStyleLbl="node1" presStyleIdx="4" presStyleCnt="15">
         <dgm:presLayoutVars>
           <dgm:chMax val="0"/>
           <dgm:bulletEnabled val="1"/>
@@ -1944,7 +2201,7 @@
       <dgm:spPr/>
     </dgm:pt>
     <dgm:pt modelId="{B2DEB886-67AD-4D10-B473-E722B128C37E}" type="pres">
-      <dgm:prSet presAssocID="{271F90CA-E68D-4DF3-9187-D5627130083A}" presName="parentText" presStyleLbl="node1" presStyleIdx="5" presStyleCnt="12">
+      <dgm:prSet presAssocID="{271F90CA-E68D-4DF3-9187-D5627130083A}" presName="parentText" presStyleLbl="node1" presStyleIdx="5" presStyleCnt="15">
         <dgm:presLayoutVars>
           <dgm:chMax val="0"/>
           <dgm:bulletEnabled val="1"/>
@@ -1957,7 +2214,7 @@
       <dgm:spPr/>
     </dgm:pt>
     <dgm:pt modelId="{113115EB-A218-444F-89FD-EC4E0D759E82}" type="pres">
-      <dgm:prSet presAssocID="{D036B2B1-3E7E-4F9A-BD15-7E1371DD27CB}" presName="parentText" presStyleLbl="node1" presStyleIdx="6" presStyleCnt="12">
+      <dgm:prSet presAssocID="{D036B2B1-3E7E-4F9A-BD15-7E1371DD27CB}" presName="parentText" presStyleLbl="node1" presStyleIdx="6" presStyleCnt="15">
         <dgm:presLayoutVars>
           <dgm:chMax val="0"/>
           <dgm:bulletEnabled val="1"/>
@@ -1970,7 +2227,7 @@
       <dgm:spPr/>
     </dgm:pt>
     <dgm:pt modelId="{3F7AA4BD-5BA9-4859-9E1B-F8A570717966}" type="pres">
-      <dgm:prSet presAssocID="{4271B710-9928-47FD-8E14-FED3B04D61BA}" presName="parentText" presStyleLbl="node1" presStyleIdx="7" presStyleCnt="12">
+      <dgm:prSet presAssocID="{4271B710-9928-47FD-8E14-FED3B04D61BA}" presName="parentText" presStyleLbl="node1" presStyleIdx="7" presStyleCnt="15">
         <dgm:presLayoutVars>
           <dgm:chMax val="0"/>
           <dgm:bulletEnabled val="1"/>
@@ -1983,7 +2240,7 @@
       <dgm:spPr/>
     </dgm:pt>
     <dgm:pt modelId="{FF6D061E-8CA5-4B29-B717-AB6F619EA33A}" type="pres">
-      <dgm:prSet presAssocID="{ABB87E2D-4656-4B45-AE63-687459A895E5}" presName="parentText" presStyleLbl="node1" presStyleIdx="8" presStyleCnt="12">
+      <dgm:prSet presAssocID="{ABB87E2D-4656-4B45-AE63-687459A895E5}" presName="parentText" presStyleLbl="node1" presStyleIdx="8" presStyleCnt="15">
         <dgm:presLayoutVars>
           <dgm:chMax val="0"/>
           <dgm:bulletEnabled val="1"/>
@@ -1996,7 +2253,7 @@
       <dgm:spPr/>
     </dgm:pt>
     <dgm:pt modelId="{855C8D91-1E45-4477-BB5F-DD1F1A2ED70C}" type="pres">
-      <dgm:prSet presAssocID="{E96BA869-1B6F-4F26-9FE0-2F51CD34BC44}" presName="parentText" presStyleLbl="node1" presStyleIdx="9" presStyleCnt="12">
+      <dgm:prSet presAssocID="{E96BA869-1B6F-4F26-9FE0-2F51CD34BC44}" presName="parentText" presStyleLbl="node1" presStyleIdx="9" presStyleCnt="15">
         <dgm:presLayoutVars>
           <dgm:chMax val="0"/>
           <dgm:bulletEnabled val="1"/>
@@ -2009,7 +2266,7 @@
       <dgm:spPr/>
     </dgm:pt>
     <dgm:pt modelId="{533A8AE7-0A4B-4EA2-83C7-89D835BD9642}" type="pres">
-      <dgm:prSet presAssocID="{9629022B-9CE8-420C-88A4-05F8ACAC9BE0}" presName="parentText" presStyleLbl="node1" presStyleIdx="10" presStyleCnt="12">
+      <dgm:prSet presAssocID="{9629022B-9CE8-420C-88A4-05F8ACAC9BE0}" presName="parentText" presStyleLbl="node1" presStyleIdx="10" presStyleCnt="15">
         <dgm:presLayoutVars>
           <dgm:chMax val="0"/>
           <dgm:bulletEnabled val="1"/>
@@ -2022,7 +2279,46 @@
       <dgm:spPr/>
     </dgm:pt>
     <dgm:pt modelId="{B4B8190B-2891-42C7-8072-5DA26FF09F19}" type="pres">
-      <dgm:prSet presAssocID="{C4344EC9-6F89-4250-9CB4-1B93F5DC2463}" presName="parentText" presStyleLbl="node1" presStyleIdx="11" presStyleCnt="12">
+      <dgm:prSet presAssocID="{C4344EC9-6F89-4250-9CB4-1B93F5DC2463}" presName="parentText" presStyleLbl="node1" presStyleIdx="11" presStyleCnt="15">
+        <dgm:presLayoutVars>
+          <dgm:chMax val="0"/>
+          <dgm:bulletEnabled val="1"/>
+        </dgm:presLayoutVars>
+      </dgm:prSet>
+      <dgm:spPr/>
+    </dgm:pt>
+    <dgm:pt modelId="{233A4749-5F2F-4CAE-80CE-27409212A946}" type="pres">
+      <dgm:prSet presAssocID="{91DF7C24-0AC8-406E-BB41-E230A25517DF}" presName="spacer" presStyleCnt="0"/>
+      <dgm:spPr/>
+    </dgm:pt>
+    <dgm:pt modelId="{205BD01C-53D0-41DC-ACF7-3B8F0576E668}" type="pres">
+      <dgm:prSet presAssocID="{1414CB55-05B5-4C02-99F8-14390BFDDBF0}" presName="parentText" presStyleLbl="node1" presStyleIdx="12" presStyleCnt="15">
+        <dgm:presLayoutVars>
+          <dgm:chMax val="0"/>
+          <dgm:bulletEnabled val="1"/>
+        </dgm:presLayoutVars>
+      </dgm:prSet>
+      <dgm:spPr/>
+    </dgm:pt>
+    <dgm:pt modelId="{424BF8D1-684D-4385-AE8D-8B0E4C114BA4}" type="pres">
+      <dgm:prSet presAssocID="{500FC536-3CC3-4E6E-9930-C2E53F7B4046}" presName="spacer" presStyleCnt="0"/>
+      <dgm:spPr/>
+    </dgm:pt>
+    <dgm:pt modelId="{1EE854CF-9BE7-4CA5-A0B6-DC38B73F8D52}" type="pres">
+      <dgm:prSet presAssocID="{6AD3977E-4573-4CDF-97AD-321C0C38DBAD}" presName="parentText" presStyleLbl="node1" presStyleIdx="13" presStyleCnt="15">
+        <dgm:presLayoutVars>
+          <dgm:chMax val="0"/>
+          <dgm:bulletEnabled val="1"/>
+        </dgm:presLayoutVars>
+      </dgm:prSet>
+      <dgm:spPr/>
+    </dgm:pt>
+    <dgm:pt modelId="{3E511DCC-18CF-456F-9BBA-4A94962E7BFC}" type="pres">
+      <dgm:prSet presAssocID="{1910FB6B-B23C-41F3-B0EA-5A4C5C062889}" presName="spacer" presStyleCnt="0"/>
+      <dgm:spPr/>
+    </dgm:pt>
+    <dgm:pt modelId="{386A165B-04E2-4447-BB61-CDA5F66D96E9}" type="pres">
+      <dgm:prSet presAssocID="{715AA07E-F50C-4C3D-BB23-747FEA4AD6D7}" presName="parentText" presStyleLbl="node1" presStyleIdx="14" presStyleCnt="15">
         <dgm:presLayoutVars>
           <dgm:chMax val="0"/>
           <dgm:bulletEnabled val="1"/>
@@ -2033,13 +2329,17 @@
   </dgm:ptLst>
   <dgm:cxnLst>
     <dgm:cxn modelId="{3874AA00-1D20-42AD-A555-6FBF79019886}" srcId="{98215B50-9504-4A40-989C-D2FBCDC99796}" destId="{9629022B-9CE8-420C-88A4-05F8ACAC9BE0}" srcOrd="10" destOrd="0" parTransId="{FF6C1D2B-4C70-4ADC-9167-0A731686B115}" sibTransId="{64F3D272-925A-4C2A-9D8C-326C8A65DE3D}"/>
+    <dgm:cxn modelId="{149E8610-E1B1-452F-90EE-86ED9A0AB225}" srcId="{98215B50-9504-4A40-989C-D2FBCDC99796}" destId="{6AD3977E-4573-4CDF-97AD-321C0C38DBAD}" srcOrd="13" destOrd="0" parTransId="{2567FF4E-94A0-4933-A6C6-A695A7FDA019}" sibTransId="{1910FB6B-B23C-41F3-B0EA-5A4C5C062889}"/>
+    <dgm:cxn modelId="{3345D211-AA89-49EC-8C84-551FF10D363C}" srcId="{98215B50-9504-4A40-989C-D2FBCDC99796}" destId="{715AA07E-F50C-4C3D-BB23-747FEA4AD6D7}" srcOrd="14" destOrd="0" parTransId="{D5CB6829-2B66-4530-AE3B-E542436319B2}" sibTransId="{CA82AE89-2807-4676-9584-418C7C8D5277}"/>
     <dgm:cxn modelId="{D5FEF72A-6748-46B9-95FA-3D905226D5C9}" srcId="{98215B50-9504-4A40-989C-D2FBCDC99796}" destId="{C4344EC9-6F89-4250-9CB4-1B93F5DC2463}" srcOrd="11" destOrd="0" parTransId="{8B0C69E0-3103-4312-88BF-263CDB5D925E}" sibTransId="{91DF7C24-0AC8-406E-BB41-E230A25517DF}"/>
     <dgm:cxn modelId="{CE004735-EE0A-4F02-A777-941216508285}" type="presOf" srcId="{C4344EC9-6F89-4250-9CB4-1B93F5DC2463}" destId="{B4B8190B-2891-42C7-8072-5DA26FF09F19}" srcOrd="0" destOrd="0" presId="urn:microsoft.com/office/officeart/2005/8/layout/vList2"/>
     <dgm:cxn modelId="{83B8CA3C-326F-45AE-AE4D-424D11126D60}" srcId="{98215B50-9504-4A40-989C-D2FBCDC99796}" destId="{D036B2B1-3E7E-4F9A-BD15-7E1371DD27CB}" srcOrd="6" destOrd="0" parTransId="{7995A870-09A7-49D4-9B1B-84635E25C3AB}" sibTransId="{1CF6187C-4FF8-44B2-99BB-1BA45325CB3E}"/>
+    <dgm:cxn modelId="{58C7AB61-320A-49E4-B7EF-46FE16869B8D}" type="presOf" srcId="{1414CB55-05B5-4C02-99F8-14390BFDDBF0}" destId="{205BD01C-53D0-41DC-ACF7-3B8F0576E668}" srcOrd="0" destOrd="0" presId="urn:microsoft.com/office/officeart/2005/8/layout/vList2"/>
     <dgm:cxn modelId="{E7E8FD4D-F32B-4981-8535-99319B44ED98}" srcId="{98215B50-9504-4A40-989C-D2FBCDC99796}" destId="{E96BA869-1B6F-4F26-9FE0-2F51CD34BC44}" srcOrd="9" destOrd="0" parTransId="{73C307E2-54F0-4764-BD09-8AC56058923E}" sibTransId="{F48ACB3C-5096-4EEF-AA75-1BB8CC4FB36B}"/>
     <dgm:cxn modelId="{B15CE674-EEE2-4616-AB93-3D4763BFB112}" type="presOf" srcId="{B7A0A0A1-7D86-4A66-AAFC-4E2C1D3B1F56}" destId="{951DA4C9-83AB-468A-AB06-088C160529DA}" srcOrd="0" destOrd="0" presId="urn:microsoft.com/office/officeart/2005/8/layout/vList2"/>
     <dgm:cxn modelId="{D07D8E55-A4C4-45A5-B121-666FF9CAA744}" srcId="{98215B50-9504-4A40-989C-D2FBCDC99796}" destId="{B7A0A0A1-7D86-4A66-AAFC-4E2C1D3B1F56}" srcOrd="3" destOrd="0" parTransId="{E14A4597-4C4E-44FC-9592-B1352BCD54DF}" sibTransId="{9643EFBB-34CF-4DC4-A9C6-1819B35368EE}"/>
     <dgm:cxn modelId="{5BC9E47E-B6BB-41AF-91FA-EE41428E1751}" srcId="{98215B50-9504-4A40-989C-D2FBCDC99796}" destId="{271F90CA-E68D-4DF3-9187-D5627130083A}" srcOrd="5" destOrd="0" parTransId="{6B92ECC4-36CA-484C-94ED-D6379A1A2BD0}" sibTransId="{9BBBDA80-95A9-4D39-A6CE-8A844DB33363}"/>
+    <dgm:cxn modelId="{52CA208A-3CD4-421C-85EA-BD161A948972}" type="presOf" srcId="{6AD3977E-4573-4CDF-97AD-321C0C38DBAD}" destId="{1EE854CF-9BE7-4CA5-A0B6-DC38B73F8D52}" srcOrd="0" destOrd="0" presId="urn:microsoft.com/office/officeart/2005/8/layout/vList2"/>
     <dgm:cxn modelId="{01544994-8A84-4EFD-B9D8-47EBF7C154A2}" srcId="{98215B50-9504-4A40-989C-D2FBCDC99796}" destId="{26C303A4-3EFC-41FF-8CBA-77C991B80472}" srcOrd="1" destOrd="0" parTransId="{3CFFF5EE-DF7D-4D7E-B473-7911EC68E0C0}" sibTransId="{2886419E-6659-4F44-9E52-BC62DF695FE3}"/>
     <dgm:cxn modelId="{D0A598A0-8ABB-4BE7-82C7-B21DE7979577}" type="presOf" srcId="{358548BA-CEDB-41BE-9655-D918CEB97FF7}" destId="{EF41CD9B-D98C-4D43-8DDA-F730EC53226C}" srcOrd="0" destOrd="0" presId="urn:microsoft.com/office/officeart/2005/8/layout/vList2"/>
     <dgm:cxn modelId="{250A5EA9-1342-429E-9C7F-9988BA296DFC}" srcId="{98215B50-9504-4A40-989C-D2FBCDC99796}" destId="{4271B710-9928-47FD-8E14-FED3B04D61BA}" srcOrd="7" destOrd="0" parTransId="{B7C65B79-D84C-4F3D-B97D-D4DD9AFDA06A}" sibTransId="{B4C7A795-EFB4-4C96-B482-CC16261346EF}"/>
@@ -2050,11 +2350,13 @@
     <dgm:cxn modelId="{2E9A07B7-C039-4046-8BB4-E025B684AB57}" type="presOf" srcId="{D036B2B1-3E7E-4F9A-BD15-7E1371DD27CB}" destId="{113115EB-A218-444F-89FD-EC4E0D759E82}" srcOrd="0" destOrd="0" presId="urn:microsoft.com/office/officeart/2005/8/layout/vList2"/>
     <dgm:cxn modelId="{719512B9-C15D-4641-82A3-E576ED4E8CC4}" type="presOf" srcId="{D6E61F26-81B9-4B62-BADD-0E0292E5001C}" destId="{FE35FEFD-BCE6-43A7-B93C-B201FC64E570}" srcOrd="0" destOrd="0" presId="urn:microsoft.com/office/officeart/2005/8/layout/vList2"/>
     <dgm:cxn modelId="{2D3EB8C5-3900-4208-9434-96C537CAE4B1}" type="presOf" srcId="{271F90CA-E68D-4DF3-9187-D5627130083A}" destId="{B2DEB886-67AD-4D10-B473-E722B128C37E}" srcOrd="0" destOrd="0" presId="urn:microsoft.com/office/officeart/2005/8/layout/vList2"/>
+    <dgm:cxn modelId="{C61566CE-2605-45D6-955E-CB4E50132391}" srcId="{98215B50-9504-4A40-989C-D2FBCDC99796}" destId="{1414CB55-05B5-4C02-99F8-14390BFDDBF0}" srcOrd="12" destOrd="0" parTransId="{507D26F8-BC79-476E-9AE6-796ADB589A9E}" sibTransId="{500FC536-3CC3-4E6E-9930-C2E53F7B4046}"/>
     <dgm:cxn modelId="{25BD54D4-C629-4CB6-A94C-FA0F637E0BFD}" srcId="{98215B50-9504-4A40-989C-D2FBCDC99796}" destId="{D6E61F26-81B9-4B62-BADD-0E0292E5001C}" srcOrd="2" destOrd="0" parTransId="{8537ECFE-BA2C-45D0-9878-7A5701C246DE}" sibTransId="{101F192D-0DA6-4A7F-A569-3F4DAB5283C0}"/>
     <dgm:cxn modelId="{EC3E16DE-0857-4ADF-BA7C-DED4CC9B098B}" type="presOf" srcId="{26C303A4-3EFC-41FF-8CBA-77C991B80472}" destId="{DB6AF47B-488C-43AA-B7DA-922C367A07B7}" srcOrd="0" destOrd="0" presId="urn:microsoft.com/office/officeart/2005/8/layout/vList2"/>
     <dgm:cxn modelId="{6A76EADF-05F5-446D-92DD-B146C1178927}" type="presOf" srcId="{4271B710-9928-47FD-8E14-FED3B04D61BA}" destId="{3F7AA4BD-5BA9-4859-9E1B-F8A570717966}" srcOrd="0" destOrd="0" presId="urn:microsoft.com/office/officeart/2005/8/layout/vList2"/>
     <dgm:cxn modelId="{C76571E6-3BDD-444F-8D6F-6FFBDECC0C9E}" type="presOf" srcId="{ABB87E2D-4656-4B45-AE63-687459A895E5}" destId="{FF6D061E-8CA5-4B29-B717-AB6F619EA33A}" srcOrd="0" destOrd="0" presId="urn:microsoft.com/office/officeart/2005/8/layout/vList2"/>
     <dgm:cxn modelId="{BF179DEA-0374-473F-A053-22170AD019F5}" type="presOf" srcId="{214F9E82-B142-4E12-9DC9-12C26A01CDF7}" destId="{19E2F9BC-F3CC-4737-A5FE-75AA42E0ACDE}" srcOrd="0" destOrd="0" presId="urn:microsoft.com/office/officeart/2005/8/layout/vList2"/>
+    <dgm:cxn modelId="{77CCFBED-051C-4296-AD17-5FD1400D5B93}" type="presOf" srcId="{715AA07E-F50C-4C3D-BB23-747FEA4AD6D7}" destId="{386A165B-04E2-4447-BB61-CDA5F66D96E9}" srcOrd="0" destOrd="0" presId="urn:microsoft.com/office/officeart/2005/8/layout/vList2"/>
     <dgm:cxn modelId="{D97647F3-1F27-407F-88E8-9027B40AEF8F}" type="presOf" srcId="{E96BA869-1B6F-4F26-9FE0-2F51CD34BC44}" destId="{855C8D91-1E45-4477-BB5F-DD1F1A2ED70C}" srcOrd="0" destOrd="0" presId="urn:microsoft.com/office/officeart/2005/8/layout/vList2"/>
     <dgm:cxn modelId="{D84E2BFA-9647-4C28-AD48-B178721A8786}" srcId="{98215B50-9504-4A40-989C-D2FBCDC99796}" destId="{ABB87E2D-4656-4B45-AE63-687459A895E5}" srcOrd="8" destOrd="0" parTransId="{4351E49A-BBCB-421F-8A75-B3C043CFDA2E}" sibTransId="{A6F6D395-1E2D-4AF6-A46F-AAC4836F12A4}"/>
     <dgm:cxn modelId="{ABA70A32-5477-4326-AB51-DA3B02F2FB1E}" type="presParOf" srcId="{482831EA-3DBD-460B-A906-08DF721ACF24}" destId="{19E2F9BC-F3CC-4737-A5FE-75AA42E0ACDE}" srcOrd="0" destOrd="0" presId="urn:microsoft.com/office/officeart/2005/8/layout/vList2"/>
@@ -2080,6 +2382,12 @@
     <dgm:cxn modelId="{DBDEAFC0-7AFD-4ED5-9E61-879F79EF46D9}" type="presParOf" srcId="{482831EA-3DBD-460B-A906-08DF721ACF24}" destId="{533A8AE7-0A4B-4EA2-83C7-89D835BD9642}" srcOrd="20" destOrd="0" presId="urn:microsoft.com/office/officeart/2005/8/layout/vList2"/>
     <dgm:cxn modelId="{9161ACA6-30B5-4C87-988D-27B6FF8E1E6D}" type="presParOf" srcId="{482831EA-3DBD-460B-A906-08DF721ACF24}" destId="{C0D0129A-2DF7-43B3-B726-AF85B95A57D2}" srcOrd="21" destOrd="0" presId="urn:microsoft.com/office/officeart/2005/8/layout/vList2"/>
     <dgm:cxn modelId="{70A09714-86F4-47BF-BFCC-E88FDF390C77}" type="presParOf" srcId="{482831EA-3DBD-460B-A906-08DF721ACF24}" destId="{B4B8190B-2891-42C7-8072-5DA26FF09F19}" srcOrd="22" destOrd="0" presId="urn:microsoft.com/office/officeart/2005/8/layout/vList2"/>
+    <dgm:cxn modelId="{F9E6D245-DE4F-4AFC-BCA0-984962E4D216}" type="presParOf" srcId="{482831EA-3DBD-460B-A906-08DF721ACF24}" destId="{233A4749-5F2F-4CAE-80CE-27409212A946}" srcOrd="23" destOrd="0" presId="urn:microsoft.com/office/officeart/2005/8/layout/vList2"/>
+    <dgm:cxn modelId="{1B353473-E7DA-420E-9D40-0A0A1580B2CE}" type="presParOf" srcId="{482831EA-3DBD-460B-A906-08DF721ACF24}" destId="{205BD01C-53D0-41DC-ACF7-3B8F0576E668}" srcOrd="24" destOrd="0" presId="urn:microsoft.com/office/officeart/2005/8/layout/vList2"/>
+    <dgm:cxn modelId="{C4AE468A-DCFD-4D12-A674-7529D38983C8}" type="presParOf" srcId="{482831EA-3DBD-460B-A906-08DF721ACF24}" destId="{424BF8D1-684D-4385-AE8D-8B0E4C114BA4}" srcOrd="25" destOrd="0" presId="urn:microsoft.com/office/officeart/2005/8/layout/vList2"/>
+    <dgm:cxn modelId="{AA89AFC8-9E90-43B7-A687-1155F87D7504}" type="presParOf" srcId="{482831EA-3DBD-460B-A906-08DF721ACF24}" destId="{1EE854CF-9BE7-4CA5-A0B6-DC38B73F8D52}" srcOrd="26" destOrd="0" presId="urn:microsoft.com/office/officeart/2005/8/layout/vList2"/>
+    <dgm:cxn modelId="{B721D419-E063-4449-9B46-C770B493A455}" type="presParOf" srcId="{482831EA-3DBD-460B-A906-08DF721ACF24}" destId="{3E511DCC-18CF-456F-9BBA-4A94962E7BFC}" srcOrd="27" destOrd="0" presId="urn:microsoft.com/office/officeart/2005/8/layout/vList2"/>
+    <dgm:cxn modelId="{AC608FB7-5827-4CEC-81BF-EBF51AFB4026}" type="presParOf" srcId="{482831EA-3DBD-460B-A906-08DF721ACF24}" destId="{386A165B-04E2-4447-BB61-CDA5F66D96E9}" srcOrd="28" destOrd="0" presId="urn:microsoft.com/office/officeart/2005/8/layout/vList2"/>
   </dgm:cxnLst>
   <dgm:bg/>
   <dgm:whole/>
@@ -2106,8 +2414,8 @@
       </dsp:nvSpPr>
       <dsp:spPr>
         <a:xfrm>
-          <a:off x="0" y="1228"/>
-          <a:ext cx="5457824" cy="453890"/>
+          <a:off x="0" y="97492"/>
+          <a:ext cx="5457824" cy="374034"/>
         </a:xfrm>
         <a:prstGeom prst="roundRect">
           <a:avLst/>
@@ -2181,8 +2489,8 @@
         </a:p>
       </dsp:txBody>
       <dsp:txXfrm>
-        <a:off x="22157" y="23385"/>
-        <a:ext cx="5413510" cy="409576"/>
+        <a:off x="18259" y="115751"/>
+        <a:ext cx="5421306" cy="337516"/>
       </dsp:txXfrm>
     </dsp:sp>
     <dsp:sp modelId="{DB6AF47B-488C-43AA-B7DA-922C367A07B7}">
@@ -2192,17 +2500,17 @@
       </dsp:nvSpPr>
       <dsp:spPr>
         <a:xfrm>
-          <a:off x="0" y="466299"/>
-          <a:ext cx="5457824" cy="453890"/>
+          <a:off x="0" y="485926"/>
+          <a:ext cx="5457824" cy="374034"/>
         </a:xfrm>
         <a:prstGeom prst="roundRect">
           <a:avLst/>
         </a:prstGeom>
         <a:solidFill>
           <a:schemeClr val="accent5">
-            <a:hueOff val="-614413"/>
-            <a:satOff val="-1584"/>
-            <a:lumOff val="-1070"/>
+            <a:hueOff val="-482753"/>
+            <a:satOff val="-1244"/>
+            <a:lumOff val="-840"/>
             <a:alphaOff val="0"/>
           </a:schemeClr>
         </a:solidFill>
@@ -2288,8 +2596,8 @@
         </a:p>
       </dsp:txBody>
       <dsp:txXfrm>
-        <a:off x="22157" y="488456"/>
-        <a:ext cx="5413510" cy="409576"/>
+        <a:off x="18259" y="504185"/>
+        <a:ext cx="5421306" cy="337516"/>
       </dsp:txXfrm>
     </dsp:sp>
     <dsp:sp modelId="{FE35FEFD-BCE6-43A7-B93C-B201FC64E570}">
@@ -2299,17 +2607,17 @@
       </dsp:nvSpPr>
       <dsp:spPr>
         <a:xfrm>
-          <a:off x="0" y="931369"/>
-          <a:ext cx="5457824" cy="453890"/>
+          <a:off x="0" y="874360"/>
+          <a:ext cx="5457824" cy="374034"/>
         </a:xfrm>
         <a:prstGeom prst="roundRect">
           <a:avLst/>
         </a:prstGeom>
         <a:solidFill>
           <a:schemeClr val="accent5">
-            <a:hueOff val="-1228826"/>
-            <a:satOff val="-3167"/>
-            <a:lumOff val="-2139"/>
+            <a:hueOff val="-965506"/>
+            <a:satOff val="-2488"/>
+            <a:lumOff val="-1681"/>
             <a:alphaOff val="0"/>
           </a:schemeClr>
         </a:solidFill>
@@ -2431,8 +2739,8 @@
         </a:p>
       </dsp:txBody>
       <dsp:txXfrm>
-        <a:off x="22157" y="953526"/>
-        <a:ext cx="5413510" cy="409576"/>
+        <a:off x="18259" y="892619"/>
+        <a:ext cx="5421306" cy="337516"/>
       </dsp:txXfrm>
     </dsp:sp>
     <dsp:sp modelId="{951DA4C9-83AB-468A-AB06-088C160529DA}">
@@ -2442,17 +2750,17 @@
       </dsp:nvSpPr>
       <dsp:spPr>
         <a:xfrm>
-          <a:off x="0" y="1396440"/>
-          <a:ext cx="5457824" cy="453890"/>
+          <a:off x="0" y="1262795"/>
+          <a:ext cx="5457824" cy="374034"/>
         </a:xfrm>
         <a:prstGeom prst="roundRect">
           <a:avLst/>
         </a:prstGeom>
         <a:solidFill>
           <a:schemeClr val="accent5">
-            <a:hueOff val="-1843239"/>
-            <a:satOff val="-4751"/>
-            <a:lumOff val="-3209"/>
+            <a:hueOff val="-1448259"/>
+            <a:satOff val="-3733"/>
+            <a:lumOff val="-2521"/>
             <a:alphaOff val="0"/>
           </a:schemeClr>
         </a:solidFill>
@@ -2553,8 +2861,8 @@
         </a:p>
       </dsp:txBody>
       <dsp:txXfrm>
-        <a:off x="22157" y="1418597"/>
-        <a:ext cx="5413510" cy="409576"/>
+        <a:off x="18259" y="1281054"/>
+        <a:ext cx="5421306" cy="337516"/>
       </dsp:txXfrm>
     </dsp:sp>
     <dsp:sp modelId="{EF41CD9B-D98C-4D43-8DDA-F730EC53226C}">
@@ -2564,17 +2872,17 @@
       </dsp:nvSpPr>
       <dsp:spPr>
         <a:xfrm>
-          <a:off x="0" y="1861511"/>
-          <a:ext cx="5457824" cy="453890"/>
+          <a:off x="0" y="1651229"/>
+          <a:ext cx="5457824" cy="374034"/>
         </a:xfrm>
         <a:prstGeom prst="roundRect">
           <a:avLst/>
         </a:prstGeom>
         <a:solidFill>
           <a:schemeClr val="accent5">
-            <a:hueOff val="-2457652"/>
-            <a:satOff val="-6334"/>
-            <a:lumOff val="-4278"/>
+            <a:hueOff val="-1931012"/>
+            <a:satOff val="-4977"/>
+            <a:lumOff val="-3361"/>
             <a:alphaOff val="0"/>
           </a:schemeClr>
         </a:solidFill>
@@ -2687,8 +2995,8 @@
         </a:p>
       </dsp:txBody>
       <dsp:txXfrm>
-        <a:off x="22157" y="1883668"/>
-        <a:ext cx="5413510" cy="409576"/>
+        <a:off x="18259" y="1669488"/>
+        <a:ext cx="5421306" cy="337516"/>
       </dsp:txXfrm>
     </dsp:sp>
     <dsp:sp modelId="{B2DEB886-67AD-4D10-B473-E722B128C37E}">
@@ -2698,17 +3006,17 @@
       </dsp:nvSpPr>
       <dsp:spPr>
         <a:xfrm>
-          <a:off x="0" y="2326581"/>
-          <a:ext cx="5457824" cy="453890"/>
+          <a:off x="0" y="2039664"/>
+          <a:ext cx="5457824" cy="374034"/>
         </a:xfrm>
         <a:prstGeom prst="roundRect">
           <a:avLst/>
         </a:prstGeom>
         <a:solidFill>
           <a:schemeClr val="accent5">
-            <a:hueOff val="-3072065"/>
-            <a:satOff val="-7918"/>
-            <a:lumOff val="-5348"/>
+            <a:hueOff val="-2413765"/>
+            <a:satOff val="-6221"/>
+            <a:lumOff val="-4202"/>
             <a:alphaOff val="0"/>
           </a:schemeClr>
         </a:solidFill>
@@ -2785,8 +3093,8 @@
         </a:p>
       </dsp:txBody>
       <dsp:txXfrm>
-        <a:off x="22157" y="2348738"/>
-        <a:ext cx="5413510" cy="409576"/>
+        <a:off x="18259" y="2057923"/>
+        <a:ext cx="5421306" cy="337516"/>
       </dsp:txXfrm>
     </dsp:sp>
     <dsp:sp modelId="{113115EB-A218-444F-89FD-EC4E0D759E82}">
@@ -2796,17 +3104,17 @@
       </dsp:nvSpPr>
       <dsp:spPr>
         <a:xfrm>
-          <a:off x="0" y="2791652"/>
-          <a:ext cx="5457824" cy="453890"/>
+          <a:off x="0" y="2428098"/>
+          <a:ext cx="5457824" cy="374034"/>
         </a:xfrm>
         <a:prstGeom prst="roundRect">
           <a:avLst/>
         </a:prstGeom>
         <a:solidFill>
           <a:schemeClr val="accent5">
-            <a:hueOff val="-3686478"/>
-            <a:satOff val="-9501"/>
-            <a:lumOff val="-6417"/>
+            <a:hueOff val="-2896518"/>
+            <a:satOff val="-7465"/>
+            <a:lumOff val="-5042"/>
             <a:alphaOff val="0"/>
           </a:schemeClr>
         </a:solidFill>
@@ -2883,8 +3191,8 @@
         </a:p>
       </dsp:txBody>
       <dsp:txXfrm>
-        <a:off x="22157" y="2813809"/>
-        <a:ext cx="5413510" cy="409576"/>
+        <a:off x="18259" y="2446357"/>
+        <a:ext cx="5421306" cy="337516"/>
       </dsp:txXfrm>
     </dsp:sp>
     <dsp:sp modelId="{3F7AA4BD-5BA9-4859-9E1B-F8A570717966}">
@@ -2894,17 +3202,17 @@
       </dsp:nvSpPr>
       <dsp:spPr>
         <a:xfrm>
-          <a:off x="0" y="3256722"/>
-          <a:ext cx="5457824" cy="453890"/>
+          <a:off x="0" y="2816532"/>
+          <a:ext cx="5457824" cy="374034"/>
         </a:xfrm>
         <a:prstGeom prst="roundRect">
           <a:avLst/>
         </a:prstGeom>
         <a:solidFill>
           <a:schemeClr val="accent5">
-            <a:hueOff val="-4300891"/>
-            <a:satOff val="-11085"/>
-            <a:lumOff val="-7487"/>
+            <a:hueOff val="-3379271"/>
+            <a:satOff val="-8710"/>
+            <a:lumOff val="-5883"/>
             <a:alphaOff val="0"/>
           </a:schemeClr>
         </a:solidFill>
@@ -3026,8 +3334,8 @@
         </a:p>
       </dsp:txBody>
       <dsp:txXfrm>
-        <a:off x="22157" y="3278879"/>
-        <a:ext cx="5413510" cy="409576"/>
+        <a:off x="18259" y="2834791"/>
+        <a:ext cx="5421306" cy="337516"/>
       </dsp:txXfrm>
     </dsp:sp>
     <dsp:sp modelId="{FF6D061E-8CA5-4B29-B717-AB6F619EA33A}">
@@ -3037,17 +3345,17 @@
       </dsp:nvSpPr>
       <dsp:spPr>
         <a:xfrm>
-          <a:off x="0" y="3721793"/>
-          <a:ext cx="5457824" cy="453890"/>
+          <a:off x="0" y="3204967"/>
+          <a:ext cx="5457824" cy="374034"/>
         </a:xfrm>
         <a:prstGeom prst="roundRect">
           <a:avLst/>
         </a:prstGeom>
         <a:solidFill>
           <a:schemeClr val="accent5">
-            <a:hueOff val="-4915304"/>
-            <a:satOff val="-12668"/>
-            <a:lumOff val="-8556"/>
+            <a:hueOff val="-3862025"/>
+            <a:satOff val="-9954"/>
+            <a:lumOff val="-6723"/>
             <a:alphaOff val="0"/>
           </a:schemeClr>
         </a:solidFill>
@@ -3175,8 +3483,8 @@
         </a:p>
       </dsp:txBody>
       <dsp:txXfrm>
-        <a:off x="22157" y="3743950"/>
-        <a:ext cx="5413510" cy="409576"/>
+        <a:off x="18259" y="3223226"/>
+        <a:ext cx="5421306" cy="337516"/>
       </dsp:txXfrm>
     </dsp:sp>
     <dsp:sp modelId="{855C8D91-1E45-4477-BB5F-DD1F1A2ED70C}">
@@ -3186,17 +3494,17 @@
       </dsp:nvSpPr>
       <dsp:spPr>
         <a:xfrm>
-          <a:off x="0" y="4186864"/>
-          <a:ext cx="5457824" cy="453890"/>
+          <a:off x="0" y="3593401"/>
+          <a:ext cx="5457824" cy="374034"/>
         </a:xfrm>
         <a:prstGeom prst="roundRect">
           <a:avLst/>
         </a:prstGeom>
         <a:solidFill>
           <a:schemeClr val="accent5">
-            <a:hueOff val="-5529717"/>
-            <a:satOff val="-14252"/>
-            <a:lumOff val="-9626"/>
+            <a:hueOff val="-4344777"/>
+            <a:satOff val="-11198"/>
+            <a:lumOff val="-7563"/>
             <a:alphaOff val="0"/>
           </a:schemeClr>
         </a:solidFill>
@@ -3324,8 +3632,8 @@
         </a:p>
       </dsp:txBody>
       <dsp:txXfrm>
-        <a:off x="22157" y="4209021"/>
-        <a:ext cx="5413510" cy="409576"/>
+        <a:off x="18259" y="3611660"/>
+        <a:ext cx="5421306" cy="337516"/>
       </dsp:txXfrm>
     </dsp:sp>
     <dsp:sp modelId="{533A8AE7-0A4B-4EA2-83C7-89D835BD9642}">
@@ -3335,17 +3643,17 @@
       </dsp:nvSpPr>
       <dsp:spPr>
         <a:xfrm>
-          <a:off x="0" y="4651934"/>
-          <a:ext cx="5457824" cy="453890"/>
+          <a:off x="0" y="3981835"/>
+          <a:ext cx="5457824" cy="374034"/>
         </a:xfrm>
         <a:prstGeom prst="roundRect">
           <a:avLst/>
         </a:prstGeom>
         <a:solidFill>
           <a:schemeClr val="accent5">
-            <a:hueOff val="-6144130"/>
-            <a:satOff val="-15835"/>
-            <a:lumOff val="-10695"/>
+            <a:hueOff val="-4827531"/>
+            <a:satOff val="-12442"/>
+            <a:lumOff val="-8404"/>
             <a:alphaOff val="0"/>
           </a:schemeClr>
         </a:solidFill>
@@ -3424,8 +3732,8 @@
         </a:p>
       </dsp:txBody>
       <dsp:txXfrm>
-        <a:off x="22157" y="4674091"/>
-        <a:ext cx="5413510" cy="409576"/>
+        <a:off x="18259" y="4000094"/>
+        <a:ext cx="5421306" cy="337516"/>
       </dsp:txXfrm>
     </dsp:sp>
     <dsp:sp modelId="{B4B8190B-2891-42C7-8072-5DA26FF09F19}">
@@ -3435,8 +3743,334 @@
       </dsp:nvSpPr>
       <dsp:spPr>
         <a:xfrm>
-          <a:off x="0" y="5117005"/>
-          <a:ext cx="5457824" cy="453890"/>
+          <a:off x="0" y="4370270"/>
+          <a:ext cx="5457824" cy="374034"/>
+        </a:xfrm>
+        <a:prstGeom prst="roundRect">
+          <a:avLst/>
+        </a:prstGeom>
+        <a:solidFill>
+          <a:schemeClr val="accent5">
+            <a:hueOff val="-5310283"/>
+            <a:satOff val="-13686"/>
+            <a:lumOff val="-9244"/>
+            <a:alphaOff val="0"/>
+          </a:schemeClr>
+        </a:solidFill>
+        <a:ln w="12700" cap="flat" cmpd="sng" algn="ctr">
+          <a:solidFill>
+            <a:schemeClr val="lt1">
+              <a:hueOff val="0"/>
+              <a:satOff val="0"/>
+              <a:lumOff val="0"/>
+              <a:alphaOff val="0"/>
+            </a:schemeClr>
+          </a:solidFill>
+          <a:prstDash val="solid"/>
+          <a:miter lim="800000"/>
+        </a:ln>
+        <a:effectLst/>
+      </dsp:spPr>
+      <dsp:style>
+        <a:lnRef idx="2">
+          <a:scrgbClr r="0" g="0" b="0"/>
+        </a:lnRef>
+        <a:fillRef idx="1">
+          <a:scrgbClr r="0" g="0" b="0"/>
+        </a:fillRef>
+        <a:effectRef idx="0">
+          <a:scrgbClr r="0" g="0" b="0"/>
+        </a:effectRef>
+        <a:fontRef idx="minor">
+          <a:schemeClr val="lt1"/>
+        </a:fontRef>
+      </dsp:style>
+      <dsp:txBody>
+        <a:bodyPr spcFirstLastPara="0" vert="horz" wrap="square" lIns="91440" tIns="91440" rIns="91440" bIns="91440" numCol="1" spcCol="1270" anchor="ctr" anchorCtr="0">
+          <a:noAutofit/>
+        </a:bodyPr>
+        <a:lstStyle/>
+        <a:p>
+          <a:pPr marL="0" lvl="0" indent="0" algn="l" defTabSz="1066800" rtl="0">
+            <a:lnSpc>
+              <a:spcPct val="90000"/>
+            </a:lnSpc>
+            <a:spcBef>
+              <a:spcPct val="0"/>
+            </a:spcBef>
+            <a:spcAft>
+              <a:spcPct val="35000"/>
+            </a:spcAft>
+            <a:buNone/>
+          </a:pPr>
+          <a:r>
+            <a:rPr lang="en-US" sz="2400" i="0" u="none" kern="1200" dirty="0" err="1">
+              <a:effectLst>
+                <a:outerShdw blurRad="38100" dist="38100" dir="2700000" algn="tl">
+                  <a:srgbClr val="000000">
+                    <a:alpha val="43137"/>
+                  </a:srgbClr>
+                </a:outerShdw>
+              </a:effectLst>
+              <a:latin typeface="+mn-lt"/>
+            </a:rPr>
+            <a:t>olivia</a:t>
+          </a:r>
+          <a:r>
+            <a:rPr lang="en-US" sz="2400" i="0" u="none" kern="1200" dirty="0">
+              <a:effectLst>
+                <a:outerShdw blurRad="38100" dist="38100" dir="2700000" algn="tl">
+                  <a:srgbClr val="000000">
+                    <a:alpha val="43137"/>
+                  </a:srgbClr>
+                </a:outerShdw>
+              </a:effectLst>
+              <a:latin typeface="+mn-lt"/>
+            </a:rPr>
+            <a:t> server number</a:t>
+          </a:r>
+        </a:p>
+      </dsp:txBody>
+      <dsp:txXfrm>
+        <a:off x="18259" y="4388529"/>
+        <a:ext cx="5421306" cy="337516"/>
+      </dsp:txXfrm>
+    </dsp:sp>
+    <dsp:sp modelId="{205BD01C-53D0-41DC-ACF7-3B8F0576E668}">
+      <dsp:nvSpPr>
+        <dsp:cNvPr id="0" name=""/>
+        <dsp:cNvSpPr/>
+      </dsp:nvSpPr>
+      <dsp:spPr>
+        <a:xfrm>
+          <a:off x="0" y="4758704"/>
+          <a:ext cx="5457824" cy="374034"/>
+        </a:xfrm>
+        <a:prstGeom prst="roundRect">
+          <a:avLst/>
+        </a:prstGeom>
+        <a:solidFill>
+          <a:schemeClr val="accent5">
+            <a:hueOff val="-5793037"/>
+            <a:satOff val="-14931"/>
+            <a:lumOff val="-10084"/>
+            <a:alphaOff val="0"/>
+          </a:schemeClr>
+        </a:solidFill>
+        <a:ln w="12700" cap="flat" cmpd="sng" algn="ctr">
+          <a:solidFill>
+            <a:schemeClr val="lt1">
+              <a:hueOff val="0"/>
+              <a:satOff val="0"/>
+              <a:lumOff val="0"/>
+              <a:alphaOff val="0"/>
+            </a:schemeClr>
+          </a:solidFill>
+          <a:prstDash val="solid"/>
+          <a:miter lim="800000"/>
+        </a:ln>
+        <a:effectLst/>
+      </dsp:spPr>
+      <dsp:style>
+        <a:lnRef idx="2">
+          <a:scrgbClr r="0" g="0" b="0"/>
+        </a:lnRef>
+        <a:fillRef idx="1">
+          <a:scrgbClr r="0" g="0" b="0"/>
+        </a:fillRef>
+        <a:effectRef idx="0">
+          <a:scrgbClr r="0" g="0" b="0"/>
+        </a:effectRef>
+        <a:fontRef idx="minor">
+          <a:schemeClr val="lt1"/>
+        </a:fontRef>
+      </dsp:style>
+      <dsp:txBody>
+        <a:bodyPr spcFirstLastPara="0" vert="horz" wrap="square" lIns="91440" tIns="91440" rIns="91440" bIns="91440" numCol="1" spcCol="1270" anchor="ctr" anchorCtr="0">
+          <a:noAutofit/>
+        </a:bodyPr>
+        <a:lstStyle/>
+        <a:p>
+          <a:pPr marL="0" lvl="0" indent="0" algn="l" defTabSz="1066800" rtl="0">
+            <a:lnSpc>
+              <a:spcPct val="90000"/>
+            </a:lnSpc>
+            <a:spcBef>
+              <a:spcPct val="0"/>
+            </a:spcBef>
+            <a:spcAft>
+              <a:spcPct val="35000"/>
+            </a:spcAft>
+            <a:buNone/>
+          </a:pPr>
+          <a:r>
+            <a:rPr lang="en-US" sz="2400" i="0" u="none" kern="1200" dirty="0" err="1">
+              <a:effectLst>
+                <a:outerShdw blurRad="38100" dist="38100" dir="2700000" algn="tl">
+                  <a:srgbClr val="000000">
+                    <a:alpha val="43137"/>
+                  </a:srgbClr>
+                </a:outerShdw>
+              </a:effectLst>
+              <a:latin typeface="+mn-lt"/>
+            </a:rPr>
+            <a:t>olivia</a:t>
+          </a:r>
+          <a:r>
+            <a:rPr lang="en-US" sz="2400" i="0" u="none" kern="1200" dirty="0">
+              <a:effectLst>
+                <a:outerShdw blurRad="38100" dist="38100" dir="2700000" algn="tl">
+                  <a:srgbClr val="000000">
+                    <a:alpha val="43137"/>
+                  </a:srgbClr>
+                </a:outerShdw>
+              </a:effectLst>
+              <a:latin typeface="+mn-lt"/>
+            </a:rPr>
+            <a:t> checklist</a:t>
+          </a:r>
+        </a:p>
+      </dsp:txBody>
+      <dsp:txXfrm>
+        <a:off x="18259" y="4776963"/>
+        <a:ext cx="5421306" cy="337516"/>
+      </dsp:txXfrm>
+    </dsp:sp>
+    <dsp:sp modelId="{1EE854CF-9BE7-4CA5-A0B6-DC38B73F8D52}">
+      <dsp:nvSpPr>
+        <dsp:cNvPr id="0" name=""/>
+        <dsp:cNvSpPr/>
+      </dsp:nvSpPr>
+      <dsp:spPr>
+        <a:xfrm>
+          <a:off x="0" y="5147139"/>
+          <a:ext cx="5457824" cy="374034"/>
+        </a:xfrm>
+        <a:prstGeom prst="roundRect">
+          <a:avLst/>
+        </a:prstGeom>
+        <a:solidFill>
+          <a:schemeClr val="accent5">
+            <a:hueOff val="-6275789"/>
+            <a:satOff val="-16175"/>
+            <a:lumOff val="-10925"/>
+            <a:alphaOff val="0"/>
+          </a:schemeClr>
+        </a:solidFill>
+        <a:ln w="12700" cap="flat" cmpd="sng" algn="ctr">
+          <a:solidFill>
+            <a:schemeClr val="lt1">
+              <a:hueOff val="0"/>
+              <a:satOff val="0"/>
+              <a:lumOff val="0"/>
+              <a:alphaOff val="0"/>
+            </a:schemeClr>
+          </a:solidFill>
+          <a:prstDash val="solid"/>
+          <a:miter lim="800000"/>
+        </a:ln>
+        <a:effectLst/>
+      </dsp:spPr>
+      <dsp:style>
+        <a:lnRef idx="2">
+          <a:scrgbClr r="0" g="0" b="0"/>
+        </a:lnRef>
+        <a:fillRef idx="1">
+          <a:scrgbClr r="0" g="0" b="0"/>
+        </a:fillRef>
+        <a:effectRef idx="0">
+          <a:scrgbClr r="0" g="0" b="0"/>
+        </a:effectRef>
+        <a:fontRef idx="minor">
+          <a:schemeClr val="lt1"/>
+        </a:fontRef>
+      </dsp:style>
+      <dsp:txBody>
+        <a:bodyPr spcFirstLastPara="0" vert="horz" wrap="square" lIns="91440" tIns="91440" rIns="91440" bIns="91440" numCol="1" spcCol="1270" anchor="ctr" anchorCtr="0">
+          <a:noAutofit/>
+        </a:bodyPr>
+        <a:lstStyle/>
+        <a:p>
+          <a:pPr marL="0" lvl="0" indent="0" algn="l" defTabSz="1066800" rtl="0">
+            <a:lnSpc>
+              <a:spcPct val="90000"/>
+            </a:lnSpc>
+            <a:spcBef>
+              <a:spcPct val="0"/>
+            </a:spcBef>
+            <a:spcAft>
+              <a:spcPct val="35000"/>
+            </a:spcAft>
+            <a:buNone/>
+          </a:pPr>
+          <a:r>
+            <a:rPr lang="en-US" sz="2400" i="0" u="none" kern="1200" dirty="0" err="1">
+              <a:effectLst>
+                <a:outerShdw blurRad="38100" dist="38100" dir="2700000" algn="tl">
+                  <a:srgbClr val="000000">
+                    <a:alpha val="43137"/>
+                  </a:srgbClr>
+                </a:outerShdw>
+              </a:effectLst>
+              <a:latin typeface="+mn-lt"/>
+            </a:rPr>
+            <a:t>olivia</a:t>
+          </a:r>
+          <a:r>
+            <a:rPr lang="en-US" sz="2400" i="0" u="none" kern="1200" dirty="0">
+              <a:effectLst>
+                <a:outerShdw blurRad="38100" dist="38100" dir="2700000" algn="tl">
+                  <a:srgbClr val="000000">
+                    <a:alpha val="43137"/>
+                  </a:srgbClr>
+                </a:outerShdw>
+              </a:effectLst>
+              <a:latin typeface="+mn-lt"/>
+            </a:rPr>
+            <a:t> </a:t>
+          </a:r>
+          <a:r>
+            <a:rPr lang="en-US" sz="2400" i="0" u="none" kern="1200" dirty="0" err="1">
+              <a:effectLst>
+                <a:outerShdw blurRad="38100" dist="38100" dir="2700000" algn="tl">
+                  <a:srgbClr val="000000">
+                    <a:alpha val="43137"/>
+                  </a:srgbClr>
+                </a:outerShdw>
+              </a:effectLst>
+              <a:latin typeface="+mn-lt"/>
+            </a:rPr>
+            <a:t>ano</a:t>
+          </a:r>
+          <a:r>
+            <a:rPr lang="en-US" sz="2400" i="0" u="none" kern="1200" dirty="0">
+              <a:effectLst>
+                <a:outerShdw blurRad="38100" dist="38100" dir="2700000" algn="tl">
+                  <a:srgbClr val="000000">
+                    <a:alpha val="43137"/>
+                  </a:srgbClr>
+                </a:outerShdw>
+              </a:effectLst>
+              <a:latin typeface="+mn-lt"/>
+            </a:rPr>
+            <a:t> number [nickname/logger]</a:t>
+          </a:r>
+        </a:p>
+      </dsp:txBody>
+      <dsp:txXfrm>
+        <a:off x="18259" y="5165398"/>
+        <a:ext cx="5421306" cy="337516"/>
+      </dsp:txXfrm>
+    </dsp:sp>
+    <dsp:sp modelId="{386A165B-04E2-4447-BB61-CDA5F66D96E9}">
+      <dsp:nvSpPr>
+        <dsp:cNvPr id="0" name=""/>
+        <dsp:cNvSpPr/>
+      </dsp:nvSpPr>
+      <dsp:spPr>
+        <a:xfrm>
+          <a:off x="0" y="5535573"/>
+          <a:ext cx="5457824" cy="374034"/>
         </a:xfrm>
         <a:prstGeom prst="roundRect">
           <a:avLst/>
@@ -3519,13 +4153,39 @@
               </a:effectLst>
               <a:latin typeface="+mn-lt"/>
             </a:rPr>
-            <a:t> server number</a:t>
+            <a:t> </a:t>
+          </a:r>
+          <a:r>
+            <a:rPr lang="en-US" sz="2400" i="0" u="none" kern="1200" dirty="0" err="1">
+              <a:effectLst>
+                <a:outerShdw blurRad="38100" dist="38100" dir="2700000" algn="tl">
+                  <a:srgbClr val="000000">
+                    <a:alpha val="43137"/>
+                  </a:srgbClr>
+                </a:outerShdw>
+              </a:effectLst>
+              <a:latin typeface="+mn-lt"/>
+            </a:rPr>
+            <a:t>kanino</a:t>
+          </a:r>
+          <a:r>
+            <a:rPr lang="en-US" sz="2400" i="0" u="none" kern="1200" dirty="0">
+              <a:effectLst>
+                <a:outerShdw blurRad="38100" dist="38100" dir="2700000" algn="tl">
+                  <a:srgbClr val="000000">
+                    <a:alpha val="43137"/>
+                  </a:srgbClr>
+                </a:outerShdw>
+              </a:effectLst>
+              <a:latin typeface="+mn-lt"/>
+            </a:rPr>
+            <a:t> number</a:t>
           </a:r>
         </a:p>
       </dsp:txBody>
       <dsp:txXfrm>
-        <a:off x="22157" y="5139162"/>
-        <a:ext cx="5413510" cy="409576"/>
+        <a:off x="18259" y="5553832"/>
+        <a:ext cx="5421306" cy="337516"/>
       </dsp:txXfrm>
     </dsp:sp>
   </dsp:spTree>
@@ -4864,7 +5524,7 @@
           <a:p>
             <a:fld id="{ACD1130F-EC56-4997-931C-BCD7591359EB}" type="datetimeFigureOut">
               <a:rPr lang="en-US" smtClean="0"/>
-              <a:t>9/16/2021</a:t>
+              <a:t>10/7/2021</a:t>
             </a:fld>
             <a:endParaRPr lang="en-US"/>
           </a:p>
@@ -5034,7 +5694,7 @@
           <a:p>
             <a:fld id="{ACD1130F-EC56-4997-931C-BCD7591359EB}" type="datetimeFigureOut">
               <a:rPr lang="en-US" smtClean="0"/>
-              <a:t>9/16/2021</a:t>
+              <a:t>10/7/2021</a:t>
             </a:fld>
             <a:endParaRPr lang="en-US"/>
           </a:p>
@@ -5214,7 +5874,7 @@
           <a:p>
             <a:fld id="{ACD1130F-EC56-4997-931C-BCD7591359EB}" type="datetimeFigureOut">
               <a:rPr lang="en-US" smtClean="0"/>
-              <a:t>9/16/2021</a:t>
+              <a:t>10/7/2021</a:t>
             </a:fld>
             <a:endParaRPr lang="en-US"/>
           </a:p>
@@ -5384,7 +6044,7 @@
           <a:p>
             <a:fld id="{ACD1130F-EC56-4997-931C-BCD7591359EB}" type="datetimeFigureOut">
               <a:rPr lang="en-US" smtClean="0"/>
-              <a:t>9/16/2021</a:t>
+              <a:t>10/7/2021</a:t>
             </a:fld>
             <a:endParaRPr lang="en-US"/>
           </a:p>
@@ -5630,7 +6290,7 @@
           <a:p>
             <a:fld id="{ACD1130F-EC56-4997-931C-BCD7591359EB}" type="datetimeFigureOut">
               <a:rPr lang="en-US" smtClean="0"/>
-              <a:t>9/16/2021</a:t>
+              <a:t>10/7/2021</a:t>
             </a:fld>
             <a:endParaRPr lang="en-US"/>
           </a:p>
@@ -5862,7 +6522,7 @@
           <a:p>
             <a:fld id="{ACD1130F-EC56-4997-931C-BCD7591359EB}" type="datetimeFigureOut">
               <a:rPr lang="en-US" smtClean="0"/>
-              <a:t>9/16/2021</a:t>
+              <a:t>10/7/2021</a:t>
             </a:fld>
             <a:endParaRPr lang="en-US"/>
           </a:p>
@@ -6229,7 +6889,7 @@
           <a:p>
             <a:fld id="{ACD1130F-EC56-4997-931C-BCD7591359EB}" type="datetimeFigureOut">
               <a:rPr lang="en-US" smtClean="0"/>
-              <a:t>9/16/2021</a:t>
+              <a:t>10/7/2021</a:t>
             </a:fld>
             <a:endParaRPr lang="en-US"/>
           </a:p>
@@ -6347,7 +7007,7 @@
           <a:p>
             <a:fld id="{ACD1130F-EC56-4997-931C-BCD7591359EB}" type="datetimeFigureOut">
               <a:rPr lang="en-US" smtClean="0"/>
-              <a:t>9/16/2021</a:t>
+              <a:t>10/7/2021</a:t>
             </a:fld>
             <a:endParaRPr lang="en-US"/>
           </a:p>
@@ -6442,7 +7102,7 @@
           <a:p>
             <a:fld id="{ACD1130F-EC56-4997-931C-BCD7591359EB}" type="datetimeFigureOut">
               <a:rPr lang="en-US" smtClean="0"/>
-              <a:t>9/16/2021</a:t>
+              <a:t>10/7/2021</a:t>
             </a:fld>
             <a:endParaRPr lang="en-US"/>
           </a:p>
@@ -6719,7 +7379,7 @@
           <a:p>
             <a:fld id="{ACD1130F-EC56-4997-931C-BCD7591359EB}" type="datetimeFigureOut">
               <a:rPr lang="en-US" smtClean="0"/>
-              <a:t>9/16/2021</a:t>
+              <a:t>10/7/2021</a:t>
             </a:fld>
             <a:endParaRPr lang="en-US"/>
           </a:p>
@@ -6976,7 +7636,7 @@
           <a:p>
             <a:fld id="{ACD1130F-EC56-4997-931C-BCD7591359EB}" type="datetimeFigureOut">
               <a:rPr lang="en-US" smtClean="0"/>
-              <a:t>9/16/2021</a:t>
+              <a:t>10/7/2021</a:t>
             </a:fld>
             <a:endParaRPr lang="en-US"/>
           </a:p>
@@ -7189,7 +7849,7 @@
           <a:p>
             <a:fld id="{ACD1130F-EC56-4997-931C-BCD7591359EB}" type="datetimeFigureOut">
               <a:rPr lang="en-US" smtClean="0"/>
-              <a:t>9/16/2021</a:t>
+              <a:t>10/7/2021</a:t>
             </a:fld>
             <a:endParaRPr lang="en-US"/>
           </a:p>
@@ -8009,14 +8669,14 @@
             <p:ph idx="1"/>
             <p:extLst>
               <p:ext uri="{D42A27DB-BD31-4B8C-83A1-F6EECF244321}">
-                <p14:modId xmlns:p14="http://schemas.microsoft.com/office/powerpoint/2010/main" val="534464945"/>
+                <p14:modId xmlns:p14="http://schemas.microsoft.com/office/powerpoint/2010/main" val="1558998611"/>
               </p:ext>
             </p:extLst>
           </p:nvPr>
         </p:nvGraphicFramePr>
         <p:xfrm>
-          <a:off x="6091238" y="642938"/>
-          <a:ext cx="5457825" cy="5572125"/>
+          <a:off x="6091238" y="495300"/>
+          <a:ext cx="5457825" cy="6007100"/>
         </p:xfrm>
         <a:graphic>
           <a:graphicData uri="http://schemas.openxmlformats.org/drawingml/2006/diagram">

</xml_diff>